<commit_message>
Get rid of some flood specific things
</commit_message>
<xml_diff>
--- a/source_code/system_sys/source_code/gui/resources/welcome_wid.pptx
+++ b/source_code/system_sys/source_code/gui/resources/welcome_wid.pptx
@@ -6,6 +6,8 @@
   </p:sldMasterIdLst>
   <p:sldIdLst>
     <p:sldId id="256" r:id="rId2"/>
+    <p:sldId id="257" r:id="rId3"/>
+    <p:sldId id="258" r:id="rId4"/>
   </p:sldIdLst>
   <p:sldSz cx="12192000" cy="6858000"/>
   <p:notesSz cx="6858000" cy="9144000"/>
@@ -112,7 +114,7 @@
             <a:srgbClr val="A4A3A4"/>
           </p15:clr>
         </p15:guide>
-        <p15:guide id="2" pos="3840" userDrawn="1">
+        <p15:guide id="2" pos="2048" userDrawn="1">
           <p15:clr>
             <a:srgbClr val="A4A3A4"/>
           </p15:clr>
@@ -272,7 +274,7 @@
           <a:p>
             <a:fld id="{2F74EC12-E969-4456-A849-A7378E4BB186}" type="datetimeFigureOut">
               <a:rPr lang="en-GB" smtClean="0"/>
-              <a:t>08/09/2023</a:t>
+              <a:t>12/09/2023</a:t>
             </a:fld>
             <a:endParaRPr lang="en-GB"/>
           </a:p>
@@ -472,7 +474,7 @@
           <a:p>
             <a:fld id="{2F74EC12-E969-4456-A849-A7378E4BB186}" type="datetimeFigureOut">
               <a:rPr lang="en-GB" smtClean="0"/>
-              <a:t>08/09/2023</a:t>
+              <a:t>12/09/2023</a:t>
             </a:fld>
             <a:endParaRPr lang="en-GB"/>
           </a:p>
@@ -682,7 +684,7 @@
           <a:p>
             <a:fld id="{2F74EC12-E969-4456-A849-A7378E4BB186}" type="datetimeFigureOut">
               <a:rPr lang="en-GB" smtClean="0"/>
-              <a:t>08/09/2023</a:t>
+              <a:t>12/09/2023</a:t>
             </a:fld>
             <a:endParaRPr lang="en-GB"/>
           </a:p>
@@ -882,7 +884,7 @@
           <a:p>
             <a:fld id="{2F74EC12-E969-4456-A849-A7378E4BB186}" type="datetimeFigureOut">
               <a:rPr lang="en-GB" smtClean="0"/>
-              <a:t>08/09/2023</a:t>
+              <a:t>12/09/2023</a:t>
             </a:fld>
             <a:endParaRPr lang="en-GB"/>
           </a:p>
@@ -1158,7 +1160,7 @@
           <a:p>
             <a:fld id="{2F74EC12-E969-4456-A849-A7378E4BB186}" type="datetimeFigureOut">
               <a:rPr lang="en-GB" smtClean="0"/>
-              <a:t>08/09/2023</a:t>
+              <a:t>12/09/2023</a:t>
             </a:fld>
             <a:endParaRPr lang="en-GB"/>
           </a:p>
@@ -1426,7 +1428,7 @@
           <a:p>
             <a:fld id="{2F74EC12-E969-4456-A849-A7378E4BB186}" type="datetimeFigureOut">
               <a:rPr lang="en-GB" smtClean="0"/>
-              <a:t>08/09/2023</a:t>
+              <a:t>12/09/2023</a:t>
             </a:fld>
             <a:endParaRPr lang="en-GB"/>
           </a:p>
@@ -1841,7 +1843,7 @@
           <a:p>
             <a:fld id="{2F74EC12-E969-4456-A849-A7378E4BB186}" type="datetimeFigureOut">
               <a:rPr lang="en-GB" smtClean="0"/>
-              <a:t>08/09/2023</a:t>
+              <a:t>12/09/2023</a:t>
             </a:fld>
             <a:endParaRPr lang="en-GB"/>
           </a:p>
@@ -1983,7 +1985,7 @@
           <a:p>
             <a:fld id="{2F74EC12-E969-4456-A849-A7378E4BB186}" type="datetimeFigureOut">
               <a:rPr lang="en-GB" smtClean="0"/>
-              <a:t>08/09/2023</a:t>
+              <a:t>12/09/2023</a:t>
             </a:fld>
             <a:endParaRPr lang="en-GB"/>
           </a:p>
@@ -2096,7 +2098,7 @@
           <a:p>
             <a:fld id="{2F74EC12-E969-4456-A849-A7378E4BB186}" type="datetimeFigureOut">
               <a:rPr lang="en-GB" smtClean="0"/>
-              <a:t>08/09/2023</a:t>
+              <a:t>12/09/2023</a:t>
             </a:fld>
             <a:endParaRPr lang="en-GB"/>
           </a:p>
@@ -2409,7 +2411,7 @@
           <a:p>
             <a:fld id="{2F74EC12-E969-4456-A849-A7378E4BB186}" type="datetimeFigureOut">
               <a:rPr lang="en-GB" smtClean="0"/>
-              <a:t>08/09/2023</a:t>
+              <a:t>12/09/2023</a:t>
             </a:fld>
             <a:endParaRPr lang="en-GB"/>
           </a:p>
@@ -2698,7 +2700,7 @@
           <a:p>
             <a:fld id="{2F74EC12-E969-4456-A849-A7378E4BB186}" type="datetimeFigureOut">
               <a:rPr lang="en-GB" smtClean="0"/>
-              <a:t>08/09/2023</a:t>
+              <a:t>12/09/2023</a:t>
             </a:fld>
             <a:endParaRPr lang="en-GB"/>
           </a:p>
@@ -2941,7 +2943,7 @@
           <a:p>
             <a:fld id="{2F74EC12-E969-4456-A849-A7378E4BB186}" type="datetimeFigureOut">
               <a:rPr lang="en-GB" smtClean="0"/>
-              <a:t>08/09/2023</a:t>
+              <a:t>12/09/2023</a:t>
             </a:fld>
             <a:endParaRPr lang="en-GB"/>
           </a:p>
@@ -3448,6 +3450,707 @@
 </p:sld>
 </file>
 
+<file path=ppt/slides/slide2.xml><?xml version="1.0" encoding="utf-8"?>
+<p:sld xmlns:a="http://schemas.openxmlformats.org/drawingml/2006/main" xmlns:r="http://schemas.openxmlformats.org/officeDocument/2006/relationships" xmlns:p="http://schemas.openxmlformats.org/presentationml/2006/main">
+  <p:cSld>
+    <p:spTree>
+      <p:nvGrpSpPr>
+        <p:cNvPr id="1" name=""/>
+        <p:cNvGrpSpPr/>
+        <p:nvPr/>
+      </p:nvGrpSpPr>
+      <p:grpSpPr>
+        <a:xfrm>
+          <a:off x="0" y="0"/>
+          <a:ext cx="0" cy="0"/>
+          <a:chOff x="0" y="0"/>
+          <a:chExt cx="0" cy="0"/>
+        </a:xfrm>
+      </p:grpSpPr>
+      <p:pic>
+        <p:nvPicPr>
+          <p:cNvPr id="6" name="Grafik 5" descr="Ein Bild, das Cartoon, Grafiken, Kreis, Logo enthält.&#10;&#10;Automatisch generierte Beschreibung">
+            <a:extLst>
+              <a:ext uri="{FF2B5EF4-FFF2-40B4-BE49-F238E27FC236}">
+                <a16:creationId xmlns:a16="http://schemas.microsoft.com/office/drawing/2014/main" id="{6E3EA4CB-34C8-BE0F-EBCD-67781BC81F53}"/>
+              </a:ext>
+            </a:extLst>
+          </p:cNvPr>
+          <p:cNvPicPr>
+            <a:picLocks noChangeAspect="1"/>
+          </p:cNvPicPr>
+          <p:nvPr/>
+        </p:nvPicPr>
+        <p:blipFill>
+          <a:blip r:embed="rId2">
+            <a:extLst>
+              <a:ext uri="{28A0092B-C50C-407E-A947-70E740481C1C}">
+                <a14:useLocalDpi xmlns:a14="http://schemas.microsoft.com/office/drawing/2010/main" val="0"/>
+              </a:ext>
+            </a:extLst>
+          </a:blip>
+          <a:stretch>
+            <a:fillRect/>
+          </a:stretch>
+        </p:blipFill>
+        <p:spPr>
+          <a:xfrm>
+            <a:off x="4497860" y="2446590"/>
+            <a:ext cx="2001736" cy="1964819"/>
+          </a:xfrm>
+          <a:prstGeom prst="rect">
+            <a:avLst/>
+          </a:prstGeom>
+        </p:spPr>
+      </p:pic>
+      <p:pic>
+        <p:nvPicPr>
+          <p:cNvPr id="3" name="Grafik 2" descr="Ein Bild, das Kreis, gelb, Symbol, Logo enthält.&#10;&#10;Automatisch generierte Beschreibung">
+            <a:extLst>
+              <a:ext uri="{FF2B5EF4-FFF2-40B4-BE49-F238E27FC236}">
+                <a16:creationId xmlns:a16="http://schemas.microsoft.com/office/drawing/2014/main" id="{D4BCD08C-4108-D1D1-8B93-FB4EC2D93376}"/>
+              </a:ext>
+            </a:extLst>
+          </p:cNvPr>
+          <p:cNvPicPr>
+            <a:picLocks noChangeAspect="1"/>
+          </p:cNvPicPr>
+          <p:nvPr/>
+        </p:nvPicPr>
+        <p:blipFill>
+          <a:blip r:embed="rId3">
+            <a:extLst>
+              <a:ext uri="{28A0092B-C50C-407E-A947-70E740481C1C}">
+                <a14:useLocalDpi xmlns:a14="http://schemas.microsoft.com/office/drawing/2010/main" val="0"/>
+              </a:ext>
+            </a:extLst>
+          </a:blip>
+          <a:stretch>
+            <a:fillRect/>
+          </a:stretch>
+        </p:blipFill>
+        <p:spPr>
+          <a:xfrm>
+            <a:off x="5906586" y="3960422"/>
+            <a:ext cx="252985" cy="252985"/>
+          </a:xfrm>
+          <a:prstGeom prst="rect">
+            <a:avLst/>
+          </a:prstGeom>
+        </p:spPr>
+      </p:pic>
+      <p:pic>
+        <p:nvPicPr>
+          <p:cNvPr id="5" name="Grafik 4" descr="Ein Bild, das Karminrot enthält.&#10;&#10;Automatisch generierte Beschreibung">
+            <a:extLst>
+              <a:ext uri="{FF2B5EF4-FFF2-40B4-BE49-F238E27FC236}">
+                <a16:creationId xmlns:a16="http://schemas.microsoft.com/office/drawing/2014/main" id="{85E5BC08-B0C0-5211-47FB-7EA1DE247742}"/>
+              </a:ext>
+            </a:extLst>
+          </p:cNvPr>
+          <p:cNvPicPr>
+            <a:picLocks noChangeAspect="1"/>
+          </p:cNvPicPr>
+          <p:nvPr/>
+        </p:nvPicPr>
+        <p:blipFill>
+          <a:blip r:embed="rId4">
+            <a:extLst>
+              <a:ext uri="{28A0092B-C50C-407E-A947-70E740481C1C}">
+                <a14:useLocalDpi xmlns:a14="http://schemas.microsoft.com/office/drawing/2010/main" val="0"/>
+              </a:ext>
+            </a:extLst>
+          </a:blip>
+          <a:stretch>
+            <a:fillRect/>
+          </a:stretch>
+        </p:blipFill>
+        <p:spPr>
+          <a:xfrm>
+            <a:off x="5908110" y="2860448"/>
+            <a:ext cx="252985" cy="252985"/>
+          </a:xfrm>
+          <a:prstGeom prst="rect">
+            <a:avLst/>
+          </a:prstGeom>
+        </p:spPr>
+      </p:pic>
+      <p:pic>
+        <p:nvPicPr>
+          <p:cNvPr id="9" name="Grafik 8" descr="Ein Bild, das Logo, Electric Blue (Farbe), Blau, Grafiken enthält.&#10;&#10;Automatisch generierte Beschreibung">
+            <a:extLst>
+              <a:ext uri="{FF2B5EF4-FFF2-40B4-BE49-F238E27FC236}">
+                <a16:creationId xmlns:a16="http://schemas.microsoft.com/office/drawing/2014/main" id="{597F08A5-F3E1-C2F7-B177-1FF0DD18B124}"/>
+              </a:ext>
+            </a:extLst>
+          </p:cNvPr>
+          <p:cNvPicPr>
+            <a:picLocks noChangeAspect="1"/>
+          </p:cNvPicPr>
+          <p:nvPr/>
+        </p:nvPicPr>
+        <p:blipFill>
+          <a:blip r:embed="rId5">
+            <a:extLst>
+              <a:ext uri="{28A0092B-C50C-407E-A947-70E740481C1C}">
+                <a14:useLocalDpi xmlns:a14="http://schemas.microsoft.com/office/drawing/2010/main" val="0"/>
+              </a:ext>
+            </a:extLst>
+          </a:blip>
+          <a:stretch>
+            <a:fillRect/>
+          </a:stretch>
+        </p:blipFill>
+        <p:spPr>
+          <a:xfrm>
+            <a:off x="5372235" y="2596929"/>
+            <a:ext cx="252985" cy="252985"/>
+          </a:xfrm>
+          <a:prstGeom prst="rect">
+            <a:avLst/>
+          </a:prstGeom>
+        </p:spPr>
+      </p:pic>
+      <p:pic>
+        <p:nvPicPr>
+          <p:cNvPr id="11" name="Grafik 10" descr="Ein Bild, das Logo, Symbol, Rechteck, Grafiken enthält.&#10;&#10;Automatisch generierte Beschreibung">
+            <a:extLst>
+              <a:ext uri="{FF2B5EF4-FFF2-40B4-BE49-F238E27FC236}">
+                <a16:creationId xmlns:a16="http://schemas.microsoft.com/office/drawing/2014/main" id="{F631F7DF-FE71-7400-48A4-0A5146847F92}"/>
+              </a:ext>
+            </a:extLst>
+          </p:cNvPr>
+          <p:cNvPicPr>
+            <a:picLocks noChangeAspect="1"/>
+          </p:cNvPicPr>
+          <p:nvPr/>
+        </p:nvPicPr>
+        <p:blipFill>
+          <a:blip r:embed="rId6">
+            <a:extLst>
+              <a:ext uri="{28A0092B-C50C-407E-A947-70E740481C1C}">
+                <a14:useLocalDpi xmlns:a14="http://schemas.microsoft.com/office/drawing/2010/main" val="0"/>
+              </a:ext>
+            </a:extLst>
+          </a:blip>
+          <a:stretch>
+            <a:fillRect/>
+          </a:stretch>
+        </p:blipFill>
+        <p:spPr>
+          <a:xfrm>
+            <a:off x="5361945" y="4085836"/>
+            <a:ext cx="252985" cy="252985"/>
+          </a:xfrm>
+          <a:prstGeom prst="rect">
+            <a:avLst/>
+          </a:prstGeom>
+        </p:spPr>
+      </p:pic>
+      <p:pic>
+        <p:nvPicPr>
+          <p:cNvPr id="13" name="Grafik 12" descr="Ein Bild, das Verkehrsschild, Schild, Reihe enthält.&#10;&#10;Automatisch generierte Beschreibung">
+            <a:extLst>
+              <a:ext uri="{FF2B5EF4-FFF2-40B4-BE49-F238E27FC236}">
+                <a16:creationId xmlns:a16="http://schemas.microsoft.com/office/drawing/2014/main" id="{5C1BC2CF-077A-13E9-C241-07354BE8DDD7}"/>
+              </a:ext>
+            </a:extLst>
+          </p:cNvPr>
+          <p:cNvPicPr>
+            <a:picLocks noChangeAspect="1"/>
+          </p:cNvPicPr>
+          <p:nvPr/>
+        </p:nvPicPr>
+        <p:blipFill>
+          <a:blip r:embed="rId7">
+            <a:extLst>
+              <a:ext uri="{28A0092B-C50C-407E-A947-70E740481C1C}">
+                <a14:useLocalDpi xmlns:a14="http://schemas.microsoft.com/office/drawing/2010/main" val="0"/>
+              </a:ext>
+            </a:extLst>
+          </a:blip>
+          <a:stretch>
+            <a:fillRect/>
+          </a:stretch>
+        </p:blipFill>
+        <p:spPr>
+          <a:xfrm>
+            <a:off x="6040509" y="3420841"/>
+            <a:ext cx="256033" cy="252985"/>
+          </a:xfrm>
+          <a:prstGeom prst="rect">
+            <a:avLst/>
+          </a:prstGeom>
+        </p:spPr>
+      </p:pic>
+    </p:spTree>
+    <p:extLst>
+      <p:ext uri="{BB962C8B-B14F-4D97-AF65-F5344CB8AC3E}">
+        <p14:creationId xmlns:p14="http://schemas.microsoft.com/office/powerpoint/2010/main" val="3006728845"/>
+      </p:ext>
+    </p:extLst>
+  </p:cSld>
+  <p:clrMapOvr>
+    <a:masterClrMapping/>
+  </p:clrMapOvr>
+</p:sld>
+</file>
+
+<file path=ppt/slides/slide3.xml><?xml version="1.0" encoding="utf-8"?>
+<p:sld xmlns:a="http://schemas.openxmlformats.org/drawingml/2006/main" xmlns:r="http://schemas.openxmlformats.org/officeDocument/2006/relationships" xmlns:p="http://schemas.openxmlformats.org/presentationml/2006/main">
+  <p:cSld>
+    <p:spTree>
+      <p:nvGrpSpPr>
+        <p:cNvPr id="1" name=""/>
+        <p:cNvGrpSpPr/>
+        <p:nvPr/>
+      </p:nvGrpSpPr>
+      <p:grpSpPr>
+        <a:xfrm>
+          <a:off x="0" y="0"/>
+          <a:ext cx="0" cy="0"/>
+          <a:chOff x="0" y="0"/>
+          <a:chExt cx="0" cy="0"/>
+        </a:xfrm>
+      </p:grpSpPr>
+      <p:pic>
+        <p:nvPicPr>
+          <p:cNvPr id="7" name="Grafik 6" descr="Ein Bild, das Text, Screenshot, Logo, Betriebssystem enthält.&#10;&#10;Automatisch generierte Beschreibung">
+            <a:extLst>
+              <a:ext uri="{FF2B5EF4-FFF2-40B4-BE49-F238E27FC236}">
+                <a16:creationId xmlns:a16="http://schemas.microsoft.com/office/drawing/2014/main" id="{1E414DFA-05DE-DCD5-A3CA-1DA582D8D414}"/>
+              </a:ext>
+            </a:extLst>
+          </p:cNvPr>
+          <p:cNvPicPr>
+            <a:picLocks noChangeAspect="1"/>
+          </p:cNvPicPr>
+          <p:nvPr/>
+        </p:nvPicPr>
+        <p:blipFill>
+          <a:blip r:embed="rId2">
+            <a:extLst>
+              <a:ext uri="{28A0092B-C50C-407E-A947-70E740481C1C}">
+                <a14:useLocalDpi xmlns:a14="http://schemas.microsoft.com/office/drawing/2010/main" val="0"/>
+              </a:ext>
+            </a:extLst>
+          </a:blip>
+          <a:stretch>
+            <a:fillRect/>
+          </a:stretch>
+        </p:blipFill>
+        <p:spPr>
+          <a:xfrm>
+            <a:off x="133350" y="95250"/>
+            <a:ext cx="11925300" cy="6667500"/>
+          </a:xfrm>
+          <a:prstGeom prst="rect">
+            <a:avLst/>
+          </a:prstGeom>
+        </p:spPr>
+      </p:pic>
+      <p:sp>
+        <p:nvSpPr>
+          <p:cNvPr id="12" name="Rechteck 11">
+            <a:extLst>
+              <a:ext uri="{FF2B5EF4-FFF2-40B4-BE49-F238E27FC236}">
+                <a16:creationId xmlns:a16="http://schemas.microsoft.com/office/drawing/2014/main" id="{CC5F6A4A-642E-633D-0580-B76B1ADB9FFE}"/>
+              </a:ext>
+            </a:extLst>
+          </p:cNvPr>
+          <p:cNvSpPr/>
+          <p:nvPr/>
+        </p:nvSpPr>
+        <p:spPr>
+          <a:xfrm>
+            <a:off x="1958525" y="2026481"/>
+            <a:ext cx="9325232" cy="3393989"/>
+          </a:xfrm>
+          <a:prstGeom prst="rect">
+            <a:avLst/>
+          </a:prstGeom>
+          <a:solidFill>
+            <a:schemeClr val="bg1"/>
+          </a:solidFill>
+          <a:ln>
+            <a:noFill/>
+          </a:ln>
+        </p:spPr>
+        <p:style>
+          <a:lnRef idx="2">
+            <a:schemeClr val="accent1">
+              <a:shade val="15000"/>
+            </a:schemeClr>
+          </a:lnRef>
+          <a:fillRef idx="1">
+            <a:schemeClr val="accent1"/>
+          </a:fillRef>
+          <a:effectRef idx="0">
+            <a:schemeClr val="accent1"/>
+          </a:effectRef>
+          <a:fontRef idx="minor">
+            <a:schemeClr val="lt1"/>
+          </a:fontRef>
+        </p:style>
+        <p:txBody>
+          <a:bodyPr rtlCol="0" anchor="ctr"/>
+          <a:lstStyle/>
+          <a:p>
+            <a:pPr algn="ctr"/>
+            <a:endParaRPr lang="en-GB"/>
+          </a:p>
+        </p:txBody>
+      </p:sp>
+      <p:grpSp>
+        <p:nvGrpSpPr>
+          <p:cNvPr id="8" name="Gruppieren 7">
+            <a:extLst>
+              <a:ext uri="{FF2B5EF4-FFF2-40B4-BE49-F238E27FC236}">
+                <a16:creationId xmlns:a16="http://schemas.microsoft.com/office/drawing/2014/main" id="{86F443B3-6A8D-5317-6FAE-33736128A538}"/>
+              </a:ext>
+            </a:extLst>
+          </p:cNvPr>
+          <p:cNvGrpSpPr/>
+          <p:nvPr/>
+        </p:nvGrpSpPr>
+        <p:grpSpPr>
+          <a:xfrm>
+            <a:off x="1567003" y="1902514"/>
+            <a:ext cx="3616410" cy="3307539"/>
+            <a:chOff x="4497860" y="2446590"/>
+            <a:chExt cx="2001736" cy="1964819"/>
+          </a:xfrm>
+        </p:grpSpPr>
+        <p:pic>
+          <p:nvPicPr>
+            <p:cNvPr id="6" name="Grafik 5" descr="Ein Bild, das Cartoon, Grafiken, Kreis, Logo enthält.&#10;&#10;Automatisch generierte Beschreibung">
+              <a:extLst>
+                <a:ext uri="{FF2B5EF4-FFF2-40B4-BE49-F238E27FC236}">
+                  <a16:creationId xmlns:a16="http://schemas.microsoft.com/office/drawing/2014/main" id="{6E3EA4CB-34C8-BE0F-EBCD-67781BC81F53}"/>
+                </a:ext>
+              </a:extLst>
+            </p:cNvPr>
+            <p:cNvPicPr>
+              <a:picLocks noChangeAspect="1"/>
+            </p:cNvPicPr>
+            <p:nvPr/>
+          </p:nvPicPr>
+          <p:blipFill>
+            <a:blip r:embed="rId3">
+              <a:extLst>
+                <a:ext uri="{28A0092B-C50C-407E-A947-70E740481C1C}">
+                  <a14:useLocalDpi xmlns:a14="http://schemas.microsoft.com/office/drawing/2010/main" val="0"/>
+                </a:ext>
+              </a:extLst>
+            </a:blip>
+            <a:stretch>
+              <a:fillRect/>
+            </a:stretch>
+          </p:blipFill>
+          <p:spPr>
+            <a:xfrm>
+              <a:off x="4497860" y="2446590"/>
+              <a:ext cx="2001736" cy="1964819"/>
+            </a:xfrm>
+            <a:prstGeom prst="rect">
+              <a:avLst/>
+            </a:prstGeom>
+          </p:spPr>
+        </p:pic>
+        <p:pic>
+          <p:nvPicPr>
+            <p:cNvPr id="3" name="Grafik 2" descr="Ein Bild, das Kreis, gelb, Symbol, Logo enthält.&#10;&#10;Automatisch generierte Beschreibung">
+              <a:extLst>
+                <a:ext uri="{FF2B5EF4-FFF2-40B4-BE49-F238E27FC236}">
+                  <a16:creationId xmlns:a16="http://schemas.microsoft.com/office/drawing/2014/main" id="{D4BCD08C-4108-D1D1-8B93-FB4EC2D93376}"/>
+                </a:ext>
+              </a:extLst>
+            </p:cNvPr>
+            <p:cNvPicPr>
+              <a:picLocks noChangeAspect="1"/>
+            </p:cNvPicPr>
+            <p:nvPr/>
+          </p:nvPicPr>
+          <p:blipFill>
+            <a:blip r:embed="rId4">
+              <a:extLst>
+                <a:ext uri="{28A0092B-C50C-407E-A947-70E740481C1C}">
+                  <a14:useLocalDpi xmlns:a14="http://schemas.microsoft.com/office/drawing/2010/main" val="0"/>
+                </a:ext>
+              </a:extLst>
+            </a:blip>
+            <a:stretch>
+              <a:fillRect/>
+            </a:stretch>
+          </p:blipFill>
+          <p:spPr>
+            <a:xfrm>
+              <a:off x="5906586" y="3960422"/>
+              <a:ext cx="252985" cy="252985"/>
+            </a:xfrm>
+            <a:prstGeom prst="rect">
+              <a:avLst/>
+            </a:prstGeom>
+          </p:spPr>
+        </p:pic>
+        <p:pic>
+          <p:nvPicPr>
+            <p:cNvPr id="5" name="Grafik 4" descr="Ein Bild, das Karminrot enthält.&#10;&#10;Automatisch generierte Beschreibung">
+              <a:extLst>
+                <a:ext uri="{FF2B5EF4-FFF2-40B4-BE49-F238E27FC236}">
+                  <a16:creationId xmlns:a16="http://schemas.microsoft.com/office/drawing/2014/main" id="{85E5BC08-B0C0-5211-47FB-7EA1DE247742}"/>
+                </a:ext>
+              </a:extLst>
+            </p:cNvPr>
+            <p:cNvPicPr>
+              <a:picLocks noChangeAspect="1"/>
+            </p:cNvPicPr>
+            <p:nvPr/>
+          </p:nvPicPr>
+          <p:blipFill>
+            <a:blip r:embed="rId5">
+              <a:extLst>
+                <a:ext uri="{28A0092B-C50C-407E-A947-70E740481C1C}">
+                  <a14:useLocalDpi xmlns:a14="http://schemas.microsoft.com/office/drawing/2010/main" val="0"/>
+                </a:ext>
+              </a:extLst>
+            </a:blip>
+            <a:stretch>
+              <a:fillRect/>
+            </a:stretch>
+          </p:blipFill>
+          <p:spPr>
+            <a:xfrm>
+              <a:off x="5908110" y="2860448"/>
+              <a:ext cx="252985" cy="252985"/>
+            </a:xfrm>
+            <a:prstGeom prst="rect">
+              <a:avLst/>
+            </a:prstGeom>
+          </p:spPr>
+        </p:pic>
+        <p:pic>
+          <p:nvPicPr>
+            <p:cNvPr id="9" name="Grafik 8" descr="Ein Bild, das Logo, Electric Blue (Farbe), Blau, Grafiken enthält.&#10;&#10;Automatisch generierte Beschreibung">
+              <a:extLst>
+                <a:ext uri="{FF2B5EF4-FFF2-40B4-BE49-F238E27FC236}">
+                  <a16:creationId xmlns:a16="http://schemas.microsoft.com/office/drawing/2014/main" id="{597F08A5-F3E1-C2F7-B177-1FF0DD18B124}"/>
+                </a:ext>
+              </a:extLst>
+            </p:cNvPr>
+            <p:cNvPicPr>
+              <a:picLocks noChangeAspect="1"/>
+            </p:cNvPicPr>
+            <p:nvPr/>
+          </p:nvPicPr>
+          <p:blipFill>
+            <a:blip r:embed="rId6">
+              <a:extLst>
+                <a:ext uri="{28A0092B-C50C-407E-A947-70E740481C1C}">
+                  <a14:useLocalDpi xmlns:a14="http://schemas.microsoft.com/office/drawing/2010/main" val="0"/>
+                </a:ext>
+              </a:extLst>
+            </a:blip>
+            <a:stretch>
+              <a:fillRect/>
+            </a:stretch>
+          </p:blipFill>
+          <p:spPr>
+            <a:xfrm>
+              <a:off x="5372235" y="2596929"/>
+              <a:ext cx="252985" cy="252985"/>
+            </a:xfrm>
+            <a:prstGeom prst="rect">
+              <a:avLst/>
+            </a:prstGeom>
+          </p:spPr>
+        </p:pic>
+        <p:pic>
+          <p:nvPicPr>
+            <p:cNvPr id="11" name="Grafik 10" descr="Ein Bild, das Logo, Symbol, Rechteck, Grafiken enthält.&#10;&#10;Automatisch generierte Beschreibung">
+              <a:extLst>
+                <a:ext uri="{FF2B5EF4-FFF2-40B4-BE49-F238E27FC236}">
+                  <a16:creationId xmlns:a16="http://schemas.microsoft.com/office/drawing/2014/main" id="{F631F7DF-FE71-7400-48A4-0A5146847F92}"/>
+                </a:ext>
+              </a:extLst>
+            </p:cNvPr>
+            <p:cNvPicPr>
+              <a:picLocks noChangeAspect="1"/>
+            </p:cNvPicPr>
+            <p:nvPr/>
+          </p:nvPicPr>
+          <p:blipFill>
+            <a:blip r:embed="rId7">
+              <a:extLst>
+                <a:ext uri="{28A0092B-C50C-407E-A947-70E740481C1C}">
+                  <a14:useLocalDpi xmlns:a14="http://schemas.microsoft.com/office/drawing/2010/main" val="0"/>
+                </a:ext>
+              </a:extLst>
+            </a:blip>
+            <a:stretch>
+              <a:fillRect/>
+            </a:stretch>
+          </p:blipFill>
+          <p:spPr>
+            <a:xfrm>
+              <a:off x="5361945" y="4085836"/>
+              <a:ext cx="252985" cy="252985"/>
+            </a:xfrm>
+            <a:prstGeom prst="rect">
+              <a:avLst/>
+            </a:prstGeom>
+          </p:spPr>
+        </p:pic>
+        <p:pic>
+          <p:nvPicPr>
+            <p:cNvPr id="13" name="Grafik 12" descr="Ein Bild, das Verkehrsschild, Schild, Reihe enthält.&#10;&#10;Automatisch generierte Beschreibung">
+              <a:extLst>
+                <a:ext uri="{FF2B5EF4-FFF2-40B4-BE49-F238E27FC236}">
+                  <a16:creationId xmlns:a16="http://schemas.microsoft.com/office/drawing/2014/main" id="{5C1BC2CF-077A-13E9-C241-07354BE8DDD7}"/>
+                </a:ext>
+              </a:extLst>
+            </p:cNvPr>
+            <p:cNvPicPr>
+              <a:picLocks noChangeAspect="1"/>
+            </p:cNvPicPr>
+            <p:nvPr/>
+          </p:nvPicPr>
+          <p:blipFill>
+            <a:blip r:embed="rId8">
+              <a:extLst>
+                <a:ext uri="{28A0092B-C50C-407E-A947-70E740481C1C}">
+                  <a14:useLocalDpi xmlns:a14="http://schemas.microsoft.com/office/drawing/2010/main" val="0"/>
+                </a:ext>
+              </a:extLst>
+            </a:blip>
+            <a:stretch>
+              <a:fillRect/>
+            </a:stretch>
+          </p:blipFill>
+          <p:spPr>
+            <a:xfrm>
+              <a:off x="6040509" y="3420841"/>
+              <a:ext cx="256033" cy="252985"/>
+            </a:xfrm>
+            <a:prstGeom prst="rect">
+              <a:avLst/>
+            </a:prstGeom>
+          </p:spPr>
+        </p:pic>
+      </p:grpSp>
+      <p:sp>
+        <p:nvSpPr>
+          <p:cNvPr id="2" name="Textfeld 1">
+            <a:extLst>
+              <a:ext uri="{FF2B5EF4-FFF2-40B4-BE49-F238E27FC236}">
+                <a16:creationId xmlns:a16="http://schemas.microsoft.com/office/drawing/2014/main" id="{AF1C7274-F807-8DC3-EE3A-ECF88A2A00F9}"/>
+              </a:ext>
+            </a:extLst>
+          </p:cNvPr>
+          <p:cNvSpPr txBox="1"/>
+          <p:nvPr/>
+        </p:nvSpPr>
+        <p:spPr>
+          <a:xfrm>
+            <a:off x="5952351" y="2424900"/>
+            <a:ext cx="4562467" cy="1200329"/>
+          </a:xfrm>
+          <a:prstGeom prst="rect">
+            <a:avLst/>
+          </a:prstGeom>
+          <a:noFill/>
+        </p:spPr>
+        <p:txBody>
+          <a:bodyPr wrap="none" rtlCol="0">
+            <a:spAutoFit/>
+          </a:bodyPr>
+          <a:lstStyle/>
+          <a:p>
+            <a:r>
+              <a:rPr lang="en-GB" sz="7200" b="1" cap="small" dirty="0">
+                <a:solidFill>
+                  <a:schemeClr val="accent1">
+                    <a:lumMod val="75000"/>
+                  </a:schemeClr>
+                </a:solidFill>
+                <a:latin typeface="Arial" panose="020B0604020202020204" pitchFamily="34" charset="0"/>
+                <a:cs typeface="Arial" panose="020B0604020202020204" pitchFamily="34" charset="0"/>
+              </a:rPr>
+              <a:t>LoFloDes</a:t>
+            </a:r>
+          </a:p>
+        </p:txBody>
+      </p:sp>
+      <p:sp>
+        <p:nvSpPr>
+          <p:cNvPr id="10" name="Textfeld 9">
+            <a:extLst>
+              <a:ext uri="{FF2B5EF4-FFF2-40B4-BE49-F238E27FC236}">
+                <a16:creationId xmlns:a16="http://schemas.microsoft.com/office/drawing/2014/main" id="{B69740C9-C460-203E-A150-731727CE2594}"/>
+              </a:ext>
+            </a:extLst>
+          </p:cNvPr>
+          <p:cNvSpPr txBox="1"/>
+          <p:nvPr/>
+        </p:nvSpPr>
+        <p:spPr>
+          <a:xfrm>
+            <a:off x="5962113" y="3496763"/>
+            <a:ext cx="3528396" cy="954107"/>
+          </a:xfrm>
+          <a:prstGeom prst="rect">
+            <a:avLst/>
+          </a:prstGeom>
+          <a:noFill/>
+        </p:spPr>
+        <p:txBody>
+          <a:bodyPr wrap="square" rtlCol="0">
+            <a:spAutoFit/>
+          </a:bodyPr>
+          <a:lstStyle/>
+          <a:p>
+            <a:r>
+              <a:rPr lang="en-GB" sz="2800" dirty="0">
+                <a:solidFill>
+                  <a:schemeClr val="tx2">
+                    <a:lumMod val="75000"/>
+                  </a:schemeClr>
+                </a:solidFill>
+                <a:latin typeface="Arial" panose="020B0604020202020204" pitchFamily="34" charset="0"/>
+                <a:cs typeface="Arial" panose="020B0604020202020204" pitchFamily="34" charset="0"/>
+              </a:rPr>
+              <a:t>Low Flow Risk</a:t>
+            </a:r>
+          </a:p>
+          <a:p>
+            <a:r>
+              <a:rPr lang="en-GB" sz="2800" dirty="0">
+                <a:solidFill>
+                  <a:schemeClr val="tx2">
+                    <a:lumMod val="75000"/>
+                  </a:schemeClr>
+                </a:solidFill>
+                <a:latin typeface="Arial" panose="020B0604020202020204" pitchFamily="34" charset="0"/>
+                <a:cs typeface="Arial" panose="020B0604020202020204" pitchFamily="34" charset="0"/>
+              </a:rPr>
+              <a:t>Decision Support</a:t>
+            </a:r>
+          </a:p>
+        </p:txBody>
+      </p:sp>
+    </p:spTree>
+    <p:extLst>
+      <p:ext uri="{BB962C8B-B14F-4D97-AF65-F5344CB8AC3E}">
+        <p14:creationId xmlns:p14="http://schemas.microsoft.com/office/powerpoint/2010/main" val="3346805731"/>
+      </p:ext>
+    </p:extLst>
+  </p:cSld>
+  <p:clrMapOvr>
+    <a:masterClrMapping/>
+  </p:clrMapOvr>
+</p:sld>
+</file>
+
 <file path=ppt/theme/theme1.xml><?xml version="1.0" encoding="utf-8"?>
 <a:theme xmlns:a="http://schemas.openxmlformats.org/drawingml/2006/main" name="Office">
   <a:themeElements>

</xml_diff>